<commit_message>
sequences updated, rmd updated
Started Introduction slides
</commit_message>
<xml_diff>
--- a/Powerpoint-Markdown.pptx
+++ b/Powerpoint-Markdown.pptx
@@ -10,6 +10,7 @@
     <p:sldId id="258" r:id="rId4"/>
     <p:sldId id="259" r:id="rId5"/>
     <p:sldId id="260" r:id="rId6"/>
+    <p:sldId id="261" r:id="rId7"/>
   </p:sldIdLst>
   <p:sldSz cx="9144000" cy="5143500" type="screen16x9"/>
   <p:notesSz cx="6858000" cy="9144000"/>
@@ -3405,7 +3406,159 @@
             </a:pPr>
             <a:r>
               <a:rPr/>
-              <a:t>Slide with R Output</a:t>
+              <a:t>Multiple Sequence Analysis – Species List</a:t>
+            </a:r>
+          </a:p>
+        </p:txBody>
+      </p:sp>
+      <p:sp>
+        <p:nvSpPr>
+          <p:cNvPr id="3" name="Content Placeholder 2"/>
+          <p:cNvSpPr>
+            <a:spLocks noGrp="1"/>
+          </p:cNvSpPr>
+          <p:nvPr>
+            <p:ph idx="1"/>
+          </p:nvPr>
+        </p:nvSpPr>
+        <p:spPr/>
+        <p:txBody>
+          <a:bodyPr/>
+          <a:lstStyle/>
+          <a:p>
+            <a:pPr lvl="0" indent="0" marL="0">
+              <a:buNone/>
+            </a:pPr>
+            <a:r>
+              <a:rPr b="1"/>
+              <a:t>Great Apes:</a:t>
+            </a:r>
+            <a:r>
+              <a:rPr/>
+              <a:t> </a:t>
+            </a:r>
+            <a:r>
+              <a:rPr i="1"/>
+              <a:t>Homo sapiens</a:t>
+            </a:r>
+            <a:r>
+              <a:rPr/>
+              <a:t> – Human; </a:t>
+            </a:r>
+            <a:r>
+              <a:rPr i="1"/>
+              <a:t>Pan troglodytes</a:t>
+            </a:r>
+            <a:r>
+              <a:rPr/>
+              <a:t> – Common chimpanzee; </a:t>
+            </a:r>
+            <a:r>
+              <a:rPr i="1"/>
+              <a:t>Pan paniscus</a:t>
+            </a:r>
+            <a:r>
+              <a:rPr/>
+              <a:t> – Bonobo; </a:t>
+            </a:r>
+            <a:r>
+              <a:rPr i="1"/>
+              <a:t>Gorilla gorilla</a:t>
+            </a:r>
+            <a:r>
+              <a:rPr/>
+              <a:t> – Western gorilla; </a:t>
+            </a:r>
+            <a:r>
+              <a:rPr i="1"/>
+              <a:t>Pongo abelii</a:t>
+            </a:r>
+            <a:r>
+              <a:rPr/>
+              <a:t> – Sumatran orangutan; </a:t>
+            </a:r>
+            <a:r>
+              <a:rPr i="1"/>
+              <a:t>Nomascus leucogenys</a:t>
+            </a:r>
+            <a:r>
+              <a:rPr/>
+              <a:t> – Northern white-cheeked gibbon</a:t>
+            </a:r>
+            <a:br/>
+            <a:r>
+              <a:rPr b="1"/>
+              <a:t>Old World Monkeys:</a:t>
+            </a:r>
+            <a:r>
+              <a:rPr/>
+              <a:t> </a:t>
+            </a:r>
+            <a:r>
+              <a:rPr i="1"/>
+              <a:t>Macaca mulatta</a:t>
+            </a:r>
+            <a:r>
+              <a:rPr/>
+              <a:t> – Rhesus macaque; </a:t>
+            </a:r>
+            <a:r>
+              <a:rPr i="1"/>
+              <a:t>Papio anubis</a:t>
+            </a:r>
+            <a:r>
+              <a:rPr/>
+              <a:t> – Olive baboon</a:t>
+            </a:r>
+            <a:br/>
+            <a:r>
+              <a:rPr b="1"/>
+              <a:t>New World Monkeys:</a:t>
+            </a:r>
+            <a:r>
+              <a:rPr/>
+              <a:t> </a:t>
+            </a:r>
+            <a:r>
+              <a:rPr i="1"/>
+              <a:t>Cebus capucinus</a:t>
+            </a:r>
+            <a:r>
+              <a:rPr/>
+              <a:t> – White-faced capuchin; </a:t>
+            </a:r>
+            <a:r>
+              <a:rPr i="1"/>
+              <a:t>Saimiri boliviensis</a:t>
+            </a:r>
+            <a:r>
+              <a:rPr/>
+              <a:t> – Bolivian squirrel monkey; </a:t>
+            </a:r>
+            <a:r>
+              <a:rPr i="1"/>
+              <a:t>Callithrix jacchus</a:t>
+            </a:r>
+            <a:r>
+              <a:rPr/>
+              <a:t> – Common marmoset</a:t>
+            </a:r>
+            <a:br/>
+            <a:r>
+              <a:rPr b="1"/>
+              <a:t>Strepsirrhines:</a:t>
+            </a:r>
+            <a:r>
+              <a:rPr/>
+              <a:t> </a:t>
+            </a:r>
+            <a:r>
+              <a:rPr i="1"/>
+              <a:t>Lemur catta</a:t>
+            </a:r>
+            <a:r>
+              <a:rPr/>
+              <a:t> – Ring-tailed lemur</a:t>
             </a:r>
           </a:p>
         </p:txBody>
@@ -3416,6 +3569,53 @@
 </file>
 
 <file path=ppt/slides/slide5.xml><?xml version="1.0" encoding="utf-8"?>
+<p:sld xmlns:a="http://schemas.openxmlformats.org/drawingml/2006/main" xmlns:r="http://schemas.openxmlformats.org/officeDocument/2006/relationships" xmlns:p="http://schemas.openxmlformats.org/presentationml/2006/main">
+  <p:cSld>
+    <p:spTree>
+      <p:nvGrpSpPr>
+        <p:cNvPr id="1" name=""/>
+        <p:cNvGrpSpPr/>
+        <p:nvPr/>
+      </p:nvGrpSpPr>
+      <p:grpSpPr>
+        <a:xfrm>
+          <a:off x="0" y="0"/>
+          <a:ext cx="0" cy="0"/>
+          <a:chOff x="0" y="0"/>
+          <a:chExt cx="0" cy="0"/>
+        </a:xfrm>
+      </p:grpSpPr>
+      <p:sp>
+        <p:nvSpPr>
+          <p:cNvPr id="2" name="Title 1"/>
+          <p:cNvSpPr>
+            <a:spLocks noGrp="1"/>
+          </p:cNvSpPr>
+          <p:nvPr>
+            <p:ph type="title"/>
+          </p:nvPr>
+        </p:nvSpPr>
+        <p:spPr/>
+        <p:txBody>
+          <a:bodyPr/>
+          <a:lstStyle/>
+          <a:p>
+            <a:pPr lvl="0" indent="0" marL="0">
+              <a:buNone/>
+            </a:pPr>
+            <a:r>
+              <a:rPr/>
+              <a:t>Molecular</a:t>
+            </a:r>
+          </a:p>
+        </p:txBody>
+      </p:sp>
+    </p:spTree>
+  </p:cSld>
+</p:sld>
+</file>
+
+<file path=ppt/slides/slide6.xml><?xml version="1.0" encoding="utf-8"?>
 <p:sld xmlns:a="http://schemas.openxmlformats.org/drawingml/2006/main" xmlns:r="http://schemas.openxmlformats.org/officeDocument/2006/relationships" xmlns:p="http://schemas.openxmlformats.org/presentationml/2006/main">
   <p:cSld>
     <p:spTree>

</xml_diff>